<commit_message>
ppt with data process overview edited
</commit_message>
<xml_diff>
--- a/misc/Data_process_workflow.pptx
+++ b/misc/Data_process_workflow.pptx
@@ -8642,6 +8642,118 @@
           </a:p>
         </p:txBody>
       </p:sp>
+      <p:grpSp>
+        <p:nvGrpSpPr>
+          <p:cNvPr id="4" name="Gruppe 3">
+            <a:extLst>
+              <a:ext uri="{FF2B5EF4-FFF2-40B4-BE49-F238E27FC236}">
+                <a16:creationId xmlns:a16="http://schemas.microsoft.com/office/drawing/2014/main" id="{4E0A1F8F-E4D7-CA4D-A2FE-7B754781A7D5}"/>
+              </a:ext>
+            </a:extLst>
+          </p:cNvPr>
+          <p:cNvGrpSpPr/>
+          <p:nvPr/>
+        </p:nvGrpSpPr>
+        <p:grpSpPr>
+          <a:xfrm>
+            <a:off x="5853813" y="2380265"/>
+            <a:ext cx="2057828" cy="3813220"/>
+            <a:chOff x="5850222" y="2386149"/>
+            <a:chExt cx="2057828" cy="3813220"/>
+          </a:xfrm>
+        </p:grpSpPr>
+        <p:sp>
+          <p:nvSpPr>
+            <p:cNvPr id="3" name="Afrundet rektangel 2">
+              <a:extLst>
+                <a:ext uri="{FF2B5EF4-FFF2-40B4-BE49-F238E27FC236}">
+                  <a16:creationId xmlns:a16="http://schemas.microsoft.com/office/drawing/2014/main" id="{17556988-CDBE-BA41-BB7B-430D965335E4}"/>
+                </a:ext>
+              </a:extLst>
+            </p:cNvPr>
+            <p:cNvSpPr/>
+            <p:nvPr/>
+          </p:nvSpPr>
+          <p:spPr>
+            <a:xfrm>
+              <a:off x="5850222" y="2682594"/>
+              <a:ext cx="2057828" cy="3516775"/>
+            </a:xfrm>
+            <a:prstGeom prst="roundRect">
+              <a:avLst/>
+            </a:prstGeom>
+            <a:noFill/>
+            <a:ln w="57150">
+              <a:solidFill>
+                <a:schemeClr val="accent6"/>
+              </a:solidFill>
+            </a:ln>
+          </p:spPr>
+          <p:style>
+            <a:lnRef idx="2">
+              <a:schemeClr val="accent1">
+                <a:shade val="50000"/>
+              </a:schemeClr>
+            </a:lnRef>
+            <a:fillRef idx="1">
+              <a:schemeClr val="accent1"/>
+            </a:fillRef>
+            <a:effectRef idx="0">
+              <a:schemeClr val="accent1"/>
+            </a:effectRef>
+            <a:fontRef idx="minor">
+              <a:schemeClr val="lt1"/>
+            </a:fontRef>
+          </p:style>
+          <p:txBody>
+            <a:bodyPr rtlCol="0" anchor="ctr"/>
+            <a:lstStyle/>
+            <a:p>
+              <a:pPr algn="ctr"/>
+              <a:endParaRPr lang="en-US"/>
+            </a:p>
+          </p:txBody>
+        </p:sp>
+        <p:sp>
+          <p:nvSpPr>
+            <p:cNvPr id="26" name="Tekstfelt 25">
+              <a:extLst>
+                <a:ext uri="{FF2B5EF4-FFF2-40B4-BE49-F238E27FC236}">
+                  <a16:creationId xmlns:a16="http://schemas.microsoft.com/office/drawing/2014/main" id="{4059F182-BDC1-744C-B574-8272825408CD}"/>
+                </a:ext>
+              </a:extLst>
+            </p:cNvPr>
+            <p:cNvSpPr txBox="1"/>
+            <p:nvPr/>
+          </p:nvSpPr>
+          <p:spPr>
+            <a:xfrm>
+              <a:off x="6583766" y="2386149"/>
+              <a:ext cx="577402" cy="338554"/>
+            </a:xfrm>
+            <a:prstGeom prst="rect">
+              <a:avLst/>
+            </a:prstGeom>
+            <a:noFill/>
+          </p:spPr>
+          <p:txBody>
+            <a:bodyPr wrap="none" rtlCol="0">
+              <a:spAutoFit/>
+            </a:bodyPr>
+            <a:lstStyle/>
+            <a:p>
+              <a:r>
+                <a:rPr lang="en-US" sz="1600" b="1" dirty="0">
+                  <a:solidFill>
+                    <a:schemeClr val="accent6"/>
+                  </a:solidFill>
+                </a:rPr>
+                <a:t>User</a:t>
+              </a:r>
+            </a:p>
+          </p:txBody>
+        </p:sp>
+      </p:grpSp>
     </p:spTree>
     <p:extLst>
       <p:ext uri="{BB962C8B-B14F-4D97-AF65-F5344CB8AC3E}">

</xml_diff>

<commit_message>
removed title on png
</commit_message>
<xml_diff>
--- a/misc/Data_process_workflow.pptx
+++ b/misc/Data_process_workflow.pptx
@@ -3966,7 +3966,7 @@
           <a:p>
             <a:fld id="{D13E1FFA-7F07-9B4D-80B5-10A6CB3A5BE1}" type="datetimeFigureOut">
               <a:rPr lang="en-US" smtClean="0"/>
-              <a:t>1/26/21</a:t>
+              <a:t>2/2/21</a:t>
             </a:fld>
             <a:endParaRPr lang="en-US"/>
           </a:p>
@@ -4467,7 +4467,7 @@
           <a:p>
             <a:fld id="{5510EF29-2467-3E4C-B7D8-506AD742B863}" type="datetimeFigureOut">
               <a:rPr lang="en-US" smtClean="0"/>
-              <a:t>1/26/21</a:t>
+              <a:t>2/2/21</a:t>
             </a:fld>
             <a:endParaRPr lang="en-US"/>
           </a:p>
@@ -4667,7 +4667,7 @@
           <a:p>
             <a:fld id="{5510EF29-2467-3E4C-B7D8-506AD742B863}" type="datetimeFigureOut">
               <a:rPr lang="en-US" smtClean="0"/>
-              <a:t>1/26/21</a:t>
+              <a:t>2/2/21</a:t>
             </a:fld>
             <a:endParaRPr lang="en-US"/>
           </a:p>
@@ -4877,7 +4877,7 @@
           <a:p>
             <a:fld id="{5510EF29-2467-3E4C-B7D8-506AD742B863}" type="datetimeFigureOut">
               <a:rPr lang="en-US" smtClean="0"/>
-              <a:t>1/26/21</a:t>
+              <a:t>2/2/21</a:t>
             </a:fld>
             <a:endParaRPr lang="en-US"/>
           </a:p>
@@ -5077,7 +5077,7 @@
           <a:p>
             <a:fld id="{5510EF29-2467-3E4C-B7D8-506AD742B863}" type="datetimeFigureOut">
               <a:rPr lang="en-US" smtClean="0"/>
-              <a:t>1/26/21</a:t>
+              <a:t>2/2/21</a:t>
             </a:fld>
             <a:endParaRPr lang="en-US"/>
           </a:p>
@@ -5353,7 +5353,7 @@
           <a:p>
             <a:fld id="{5510EF29-2467-3E4C-B7D8-506AD742B863}" type="datetimeFigureOut">
               <a:rPr lang="en-US" smtClean="0"/>
-              <a:t>1/26/21</a:t>
+              <a:t>2/2/21</a:t>
             </a:fld>
             <a:endParaRPr lang="en-US"/>
           </a:p>
@@ -5621,7 +5621,7 @@
           <a:p>
             <a:fld id="{5510EF29-2467-3E4C-B7D8-506AD742B863}" type="datetimeFigureOut">
               <a:rPr lang="en-US" smtClean="0"/>
-              <a:t>1/26/21</a:t>
+              <a:t>2/2/21</a:t>
             </a:fld>
             <a:endParaRPr lang="en-US"/>
           </a:p>
@@ -6036,7 +6036,7 @@
           <a:p>
             <a:fld id="{5510EF29-2467-3E4C-B7D8-506AD742B863}" type="datetimeFigureOut">
               <a:rPr lang="en-US" smtClean="0"/>
-              <a:t>1/26/21</a:t>
+              <a:t>2/2/21</a:t>
             </a:fld>
             <a:endParaRPr lang="en-US"/>
           </a:p>
@@ -6178,7 +6178,7 @@
           <a:p>
             <a:fld id="{5510EF29-2467-3E4C-B7D8-506AD742B863}" type="datetimeFigureOut">
               <a:rPr lang="en-US" smtClean="0"/>
-              <a:t>1/26/21</a:t>
+              <a:t>2/2/21</a:t>
             </a:fld>
             <a:endParaRPr lang="en-US"/>
           </a:p>
@@ -6291,7 +6291,7 @@
           <a:p>
             <a:fld id="{5510EF29-2467-3E4C-B7D8-506AD742B863}" type="datetimeFigureOut">
               <a:rPr lang="en-US" smtClean="0"/>
-              <a:t>1/26/21</a:t>
+              <a:t>2/2/21</a:t>
             </a:fld>
             <a:endParaRPr lang="en-US"/>
           </a:p>
@@ -6604,7 +6604,7 @@
           <a:p>
             <a:fld id="{5510EF29-2467-3E4C-B7D8-506AD742B863}" type="datetimeFigureOut">
               <a:rPr lang="en-US" smtClean="0"/>
-              <a:t>1/26/21</a:t>
+              <a:t>2/2/21</a:t>
             </a:fld>
             <a:endParaRPr lang="en-US"/>
           </a:p>
@@ -6893,7 +6893,7 @@
           <a:p>
             <a:fld id="{5510EF29-2467-3E4C-B7D8-506AD742B863}" type="datetimeFigureOut">
               <a:rPr lang="en-US" smtClean="0"/>
-              <a:t>1/26/21</a:t>
+              <a:t>2/2/21</a:t>
             </a:fld>
             <a:endParaRPr lang="en-US"/>
           </a:p>
@@ -7136,7 +7136,7 @@
           <a:p>
             <a:fld id="{5510EF29-2467-3E4C-B7D8-506AD742B863}" type="datetimeFigureOut">
               <a:rPr lang="en-US" smtClean="0"/>
-              <a:t>1/26/21</a:t>
+              <a:t>2/2/21</a:t>
             </a:fld>
             <a:endParaRPr lang="en-US"/>
           </a:p>
@@ -8607,41 +8607,6 @@
           </p:sp>
         </p:grpSp>
       </p:grpSp>
-      <p:sp>
-        <p:nvSpPr>
-          <p:cNvPr id="73" name="Tekstfelt 72">
-            <a:extLst>
-              <a:ext uri="{FF2B5EF4-FFF2-40B4-BE49-F238E27FC236}">
-                <a16:creationId xmlns:a16="http://schemas.microsoft.com/office/drawing/2014/main" id="{C9A83958-257D-224E-ABB5-015F2F669F90}"/>
-              </a:ext>
-            </a:extLst>
-          </p:cNvPr>
-          <p:cNvSpPr txBox="1"/>
-          <p:nvPr/>
-        </p:nvSpPr>
-        <p:spPr>
-          <a:xfrm>
-            <a:off x="447174" y="71298"/>
-            <a:ext cx="4530086" cy="461665"/>
-          </a:xfrm>
-          <a:prstGeom prst="rect">
-            <a:avLst/>
-          </a:prstGeom>
-          <a:noFill/>
-        </p:spPr>
-        <p:txBody>
-          <a:bodyPr wrap="none" rtlCol="0">
-            <a:spAutoFit/>
-          </a:bodyPr>
-          <a:lstStyle/>
-          <a:p>
-            <a:r>
-              <a:rPr lang="en-US" sz="2400" dirty="0"/>
-              <a:t>Automating data analysis workflow</a:t>
-            </a:r>
-          </a:p>
-        </p:txBody>
-      </p:sp>
       <p:grpSp>
         <p:nvGrpSpPr>
           <p:cNvPr id="4" name="Gruppe 3">

</xml_diff>